<commit_message>
verslag gelezen tot simulator
</commit_message>
<xml_diff>
--- a/SilverSurferVerslag/Verslag demo 5/Klassendiagramma.pptx
+++ b/SilverSurferVerslag/Verslag demo 5/Klassendiagramma.pptx
@@ -5094,10 +5094,10 @@
         </p:nvGrpSpPr>
         <p:grpSpPr>
           <a:xfrm>
-            <a:off x="442315" y="150418"/>
-            <a:ext cx="8276433" cy="6471896"/>
-            <a:chOff x="474933" y="320525"/>
-            <a:chExt cx="6207325" cy="8629195"/>
+            <a:off x="342306" y="548680"/>
+            <a:ext cx="8500865" cy="5864615"/>
+            <a:chOff x="759532" y="-227018"/>
+            <a:chExt cx="6375648" cy="7819487"/>
           </a:xfrm>
         </p:grpSpPr>
         <p:grpSp>
@@ -5108,10 +5108,10 @@
           </p:nvGrpSpPr>
           <p:grpSpPr>
             <a:xfrm>
-              <a:off x="474933" y="320525"/>
-              <a:ext cx="5350789" cy="4243361"/>
-              <a:chOff x="-158225" y="136729"/>
-              <a:chExt cx="10324441" cy="5807935"/>
+              <a:off x="759532" y="-227018"/>
+              <a:ext cx="4949227" cy="4958611"/>
+              <a:chOff x="390913" y="-612698"/>
+              <a:chExt cx="9549617" cy="6786903"/>
             </a:xfrm>
           </p:grpSpPr>
           <p:grpSp>
@@ -5122,10 +5122,10 @@
             </p:nvGrpSpPr>
             <p:grpSpPr>
               <a:xfrm>
-                <a:off x="1209928" y="3055664"/>
-                <a:ext cx="3362075" cy="2355407"/>
-                <a:chOff x="1209928" y="3055664"/>
-                <a:chExt cx="3362075" cy="2355407"/>
+                <a:off x="1562187" y="3067253"/>
+                <a:ext cx="2725094" cy="2573359"/>
+                <a:chOff x="1562187" y="3067253"/>
+                <a:chExt cx="2725094" cy="2573359"/>
               </a:xfrm>
             </p:grpSpPr>
             <p:cxnSp>
@@ -5138,9 +5138,9 @@
                 <p:nvPr/>
               </p:nvCxnSpPr>
               <p:spPr>
-                <a:xfrm rot="16200000" flipH="1">
-                  <a:off x="3219102" y="2842220"/>
-                  <a:ext cx="1139455" cy="1566343"/>
+                <a:xfrm rot="5400000">
+                  <a:off x="1667493" y="2961950"/>
+                  <a:ext cx="1127865" cy="1338476"/>
                 </a:xfrm>
                 <a:prstGeom prst="bentConnector3">
                   <a:avLst>
@@ -5180,9 +5180,9 @@
                 <p:nvPr/>
               </p:nvCxnSpPr>
               <p:spPr>
-                <a:xfrm rot="5400000">
-                  <a:off x="1536397" y="2729197"/>
-                  <a:ext cx="1142793" cy="1795731"/>
+                <a:xfrm rot="16200000" flipH="1">
+                  <a:off x="3030038" y="2937878"/>
+                  <a:ext cx="1127867" cy="1386618"/>
                 </a:xfrm>
                 <a:prstGeom prst="bentConnector3">
                   <a:avLst>
@@ -5223,8 +5223,8 @@
               </p:nvCxnSpPr>
               <p:spPr>
                 <a:xfrm>
-                  <a:off x="4572002" y="4728714"/>
-                  <a:ext cx="1" cy="682357"/>
+                  <a:off x="1562187" y="4728711"/>
+                  <a:ext cx="0" cy="911901"/>
                 </a:xfrm>
                 <a:prstGeom prst="straightConnector1">
                   <a:avLst/>
@@ -5261,10 +5261,10 @@
             </p:nvGrpSpPr>
             <p:grpSpPr>
               <a:xfrm>
-                <a:off x="-158225" y="136729"/>
-                <a:ext cx="10324441" cy="5807935"/>
-                <a:chOff x="-158225" y="136729"/>
-                <a:chExt cx="10324441" cy="5807935"/>
+                <a:off x="390913" y="-612698"/>
+                <a:ext cx="9549617" cy="6786903"/>
+                <a:chOff x="390913" y="-612698"/>
+                <a:chExt cx="9549617" cy="6786903"/>
               </a:xfrm>
             </p:grpSpPr>
             <p:sp>
@@ -5277,8 +5277,8 @@
               </p:nvSpPr>
               <p:spPr>
                 <a:xfrm>
-                  <a:off x="1608519" y="136729"/>
-                  <a:ext cx="2736305" cy="674012"/>
+                  <a:off x="1729391" y="-612698"/>
+                  <a:ext cx="2342547" cy="674012"/>
                 </a:xfrm>
                 <a:prstGeom prst="rect">
                   <a:avLst/>
@@ -5326,8 +5326,8 @@
               </p:nvSpPr>
               <p:spPr>
                 <a:xfrm>
-                  <a:off x="1608518" y="1408588"/>
-                  <a:ext cx="2736305" cy="533593"/>
+                  <a:off x="1729391" y="1007859"/>
+                  <a:ext cx="2342547" cy="533593"/>
                 </a:xfrm>
                 <a:prstGeom prst="rect">
                   <a:avLst/>
@@ -5370,8 +5370,8 @@
               </p:nvSpPr>
               <p:spPr>
                 <a:xfrm>
-                  <a:off x="3203850" y="5411071"/>
-                  <a:ext cx="2736305" cy="533593"/>
+                  <a:off x="390913" y="5640612"/>
+                  <a:ext cx="2342547" cy="533593"/>
                 </a:xfrm>
                 <a:prstGeom prst="rect">
                   <a:avLst/>
@@ -5414,8 +5414,8 @@
               </p:nvSpPr>
               <p:spPr>
                 <a:xfrm>
-                  <a:off x="-158225" y="4198459"/>
-                  <a:ext cx="2736305" cy="533593"/>
+                  <a:off x="3116007" y="4195121"/>
+                  <a:ext cx="2342545" cy="533593"/>
                 </a:xfrm>
                 <a:prstGeom prst="rect">
                   <a:avLst/>
@@ -5461,8 +5461,8 @@
               </p:nvSpPr>
               <p:spPr>
                 <a:xfrm>
-                  <a:off x="1637506" y="2522073"/>
-                  <a:ext cx="2736305" cy="533593"/>
+                  <a:off x="1729389" y="2533661"/>
+                  <a:ext cx="2342546" cy="533593"/>
                 </a:xfrm>
                 <a:prstGeom prst="rect">
                   <a:avLst/>
@@ -5508,8 +5508,8 @@
               </p:nvSpPr>
               <p:spPr>
                 <a:xfrm>
-                  <a:off x="7429911" y="4198459"/>
-                  <a:ext cx="2736305" cy="533593"/>
+                  <a:off x="7597986" y="2545806"/>
+                  <a:ext cx="2342544" cy="533593"/>
                 </a:xfrm>
                 <a:prstGeom prst="rect">
                   <a:avLst/>
@@ -5555,8 +5555,8 @@
               </p:nvSpPr>
               <p:spPr>
                 <a:xfrm>
-                  <a:off x="3203849" y="4195121"/>
-                  <a:ext cx="2736305" cy="533593"/>
+                  <a:off x="390914" y="4195119"/>
+                  <a:ext cx="2342545" cy="533593"/>
                 </a:xfrm>
                 <a:prstGeom prst="rect">
                   <a:avLst/>
@@ -5598,10 +5598,10 @@
             </p:nvGrpSpPr>
             <p:grpSpPr>
               <a:xfrm>
-                <a:off x="2976672" y="810741"/>
-                <a:ext cx="4453239" cy="3654515"/>
-                <a:chOff x="2976672" y="810741"/>
-                <a:chExt cx="4453239" cy="3654515"/>
+                <a:off x="2900664" y="61313"/>
+                <a:ext cx="4697322" cy="2751290"/>
+                <a:chOff x="2900664" y="61313"/>
+                <a:chExt cx="4697322" cy="2751290"/>
               </a:xfrm>
             </p:grpSpPr>
             <p:cxnSp>
@@ -5615,8 +5615,8 @@
               </p:nvCxnSpPr>
               <p:spPr>
                 <a:xfrm flipV="1">
-                  <a:off x="2976672" y="810741"/>
-                  <a:ext cx="1" cy="597847"/>
+                  <a:off x="2900665" y="61313"/>
+                  <a:ext cx="0" cy="946545"/>
                 </a:xfrm>
                 <a:prstGeom prst="straightConnector1">
                   <a:avLst/>
@@ -5651,9 +5651,9 @@
                 <p:nvPr/>
               </p:nvCxnSpPr>
               <p:spPr>
-                <a:xfrm flipH="1" flipV="1">
-                  <a:off x="2976672" y="1942181"/>
-                  <a:ext cx="28988" cy="579892"/>
+                <a:xfrm flipV="1">
+                  <a:off x="2900664" y="1541451"/>
+                  <a:ext cx="1" cy="992209"/>
                 </a:xfrm>
                 <a:prstGeom prst="straightConnector1">
                   <a:avLst/>
@@ -5683,14 +5683,14 @@
                 <p:cNvPr id="10" name="Rechte verbindingslijn met pijl 9"/>
                 <p:cNvCxnSpPr>
                   <a:stCxn id="16" idx="1"/>
-                  <a:endCxn id="18" idx="3"/>
+                  <a:endCxn id="15" idx="3"/>
                 </p:cNvCxnSpPr>
                 <p:nvPr/>
               </p:nvCxnSpPr>
               <p:spPr>
                 <a:xfrm flipH="1" flipV="1">
-                  <a:off x="5940155" y="4461918"/>
-                  <a:ext cx="1489756" cy="3338"/>
+                  <a:off x="4071934" y="2800458"/>
+                  <a:ext cx="3526052" cy="12145"/>
                 </a:xfrm>
                 <a:prstGeom prst="straightConnector1">
                   <a:avLst/>
@@ -5725,10 +5725,10 @@
           </p:nvGrpSpPr>
           <p:grpSpPr>
             <a:xfrm>
-              <a:off x="2756919" y="3677933"/>
-              <a:ext cx="3925339" cy="3849991"/>
-              <a:chOff x="1332150" y="-117330"/>
-              <a:chExt cx="9790093" cy="3995262"/>
+              <a:off x="3785637" y="2470482"/>
+              <a:ext cx="3349543" cy="3476483"/>
+              <a:chOff x="3897853" y="-1370341"/>
+              <a:chExt cx="8354015" cy="3607660"/>
             </a:xfrm>
           </p:grpSpPr>
           <p:grpSp>
@@ -5739,10 +5739,10 @@
             </p:nvGrpSpPr>
             <p:grpSpPr>
               <a:xfrm>
-                <a:off x="3063159" y="-117330"/>
-                <a:ext cx="6289510" cy="3078688"/>
-                <a:chOff x="3063159" y="-117330"/>
-                <a:chExt cx="6289510" cy="3078688"/>
+                <a:off x="5411830" y="-1370341"/>
+                <a:ext cx="5326061" cy="2371610"/>
+                <a:chOff x="5411830" y="-1370341"/>
+                <a:chExt cx="5326061" cy="2371610"/>
               </a:xfrm>
             </p:grpSpPr>
             <p:cxnSp>
@@ -5755,9 +5755,9 @@
                 <p:nvPr/>
               </p:nvCxnSpPr>
               <p:spPr>
-                <a:xfrm rot="5400000">
-                  <a:off x="5505942" y="-461975"/>
-                  <a:ext cx="1366931" cy="2056221"/>
+                <a:xfrm rot="16200000" flipH="1">
+                  <a:off x="7641559" y="-1831611"/>
+                  <a:ext cx="845921" cy="1768462"/>
                 </a:xfrm>
                 <a:prstGeom prst="bentConnector3">
                   <a:avLst/>
@@ -5795,9 +5795,9 @@
                 <p:nvPr/>
               </p:nvCxnSpPr>
               <p:spPr>
-                <a:xfrm rot="16200000" flipH="1">
-                  <a:off x="7594433" y="-494245"/>
-                  <a:ext cx="1381321" cy="2135151"/>
+                <a:xfrm rot="5400000">
+                  <a:off x="5873099" y="-1831609"/>
+                  <a:ext cx="845921" cy="1768460"/>
                 </a:xfrm>
                 <a:prstGeom prst="bentConnector3">
                   <a:avLst>
@@ -5838,8 +5838,8 @@
               </p:nvCxnSpPr>
               <p:spPr>
                 <a:xfrm rot="5400000">
-                  <a:off x="3458630" y="1258692"/>
-                  <a:ext cx="1307195" cy="2098138"/>
+                  <a:off x="7503960" y="-443525"/>
+                  <a:ext cx="1121128" cy="1768459"/>
                 </a:xfrm>
                 <a:prstGeom prst="bentConnector3">
                   <a:avLst/>
@@ -5878,8 +5878,8 @@
               </p:nvCxnSpPr>
               <p:spPr>
                 <a:xfrm rot="16200000" flipH="1">
-                  <a:off x="5498018" y="1317441"/>
-                  <a:ext cx="1307195" cy="1980639"/>
+                  <a:off x="9282758" y="-453865"/>
+                  <a:ext cx="1121128" cy="1789139"/>
                 </a:xfrm>
                 <a:prstGeom prst="bentConnector3">
                   <a:avLst/>
@@ -5916,10 +5916,10 @@
             </p:nvGrpSpPr>
             <p:grpSpPr>
               <a:xfrm>
-                <a:off x="1332150" y="1249602"/>
-                <a:ext cx="9790093" cy="2116317"/>
-                <a:chOff x="1332150" y="1249602"/>
-                <a:chExt cx="9790093" cy="2116317"/>
+                <a:off x="3897853" y="-524420"/>
+                <a:ext cx="8354015" cy="1930250"/>
+                <a:chOff x="3897853" y="-524420"/>
+                <a:chExt cx="8354015" cy="1930250"/>
               </a:xfrm>
             </p:grpSpPr>
             <p:sp>
@@ -5932,8 +5932,8 @@
               </p:nvSpPr>
               <p:spPr>
                 <a:xfrm>
-                  <a:off x="3391719" y="1249602"/>
-                  <a:ext cx="3539154" cy="404561"/>
+                  <a:off x="7434775" y="-524420"/>
+                  <a:ext cx="3027952" cy="404561"/>
                 </a:xfrm>
                 <a:prstGeom prst="rect">
                   <a:avLst/>
@@ -5979,8 +5979,8 @@
               </p:nvSpPr>
               <p:spPr>
                 <a:xfrm>
-                  <a:off x="5373473" y="2961358"/>
-                  <a:ext cx="3536924" cy="404561"/>
+                  <a:off x="9223912" y="1001269"/>
+                  <a:ext cx="3027956" cy="404561"/>
                 </a:xfrm>
                 <a:prstGeom prst="rect">
                   <a:avLst/>
@@ -6026,8 +6026,8 @@
               </p:nvSpPr>
               <p:spPr>
                 <a:xfrm>
-                  <a:off x="1332150" y="2961358"/>
-                  <a:ext cx="3462014" cy="404561"/>
+                  <a:off x="5666317" y="1001269"/>
+                  <a:ext cx="3027952" cy="404561"/>
                 </a:xfrm>
                 <a:prstGeom prst="rect">
                   <a:avLst/>
@@ -6073,8 +6073,8 @@
               </p:nvSpPr>
               <p:spPr>
                 <a:xfrm>
-                  <a:off x="7583091" y="1263992"/>
-                  <a:ext cx="3539152" cy="404561"/>
+                  <a:off x="3897853" y="-524420"/>
+                  <a:ext cx="3027951" cy="404561"/>
                 </a:xfrm>
                 <a:prstGeom prst="rect">
                   <a:avLst/>
@@ -6122,8 +6122,8 @@
             </p:nvCxnSpPr>
             <p:spPr>
               <a:xfrm>
-                <a:off x="3063158" y="3365919"/>
-                <a:ext cx="18472" cy="512013"/>
+                <a:off x="7180293" y="1405830"/>
+                <a:ext cx="0" cy="831490"/>
               </a:xfrm>
               <a:prstGeom prst="straightConnector1">
                 <a:avLst/>
@@ -6157,10 +6157,10 @@
           </p:nvGrpSpPr>
           <p:grpSpPr>
             <a:xfrm>
-              <a:off x="654165" y="6644677"/>
-              <a:ext cx="3508689" cy="2305043"/>
-              <a:chOff x="-8093733" y="1121270"/>
-              <a:chExt cx="7272675" cy="2960697"/>
+              <a:off x="2870119" y="4755860"/>
+              <a:ext cx="2842624" cy="2836609"/>
+              <a:chOff x="-3500590" y="-1304809"/>
+              <a:chExt cx="5892082" cy="3643462"/>
             </a:xfrm>
           </p:grpSpPr>
           <p:sp>
@@ -6173,8 +6173,8 @@
             </p:nvSpPr>
             <p:spPr>
               <a:xfrm>
-                <a:off x="-3741500" y="2255751"/>
-                <a:ext cx="2920442" cy="500741"/>
+                <a:off x="-133218" y="225098"/>
+                <a:ext cx="2516454" cy="500741"/>
               </a:xfrm>
               <a:prstGeom prst="rect">
                 <a:avLst/>
@@ -6219,8 +6219,8 @@
             </p:nvSpPr>
             <p:spPr>
               <a:xfrm>
-                <a:off x="-8093733" y="2255751"/>
-                <a:ext cx="3177352" cy="500741"/>
+                <a:off x="-3500590" y="225097"/>
+                <a:ext cx="2516452" cy="500741"/>
               </a:xfrm>
               <a:prstGeom prst="rect">
                 <a:avLst/>
@@ -6266,8 +6266,8 @@
             </p:nvSpPr>
             <p:spPr>
               <a:xfrm>
-                <a:off x="-7850747" y="1121270"/>
-                <a:ext cx="2724773" cy="500741"/>
+                <a:off x="-3500590" y="-1304809"/>
+                <a:ext cx="2516452" cy="500741"/>
               </a:xfrm>
               <a:prstGeom prst="rect">
                 <a:avLst/>
@@ -6313,8 +6313,8 @@
             </p:nvSpPr>
             <p:spPr>
               <a:xfrm>
-                <a:off x="-3741500" y="3449452"/>
-                <a:ext cx="2920442" cy="632515"/>
+                <a:off x="-124964" y="1706139"/>
+                <a:ext cx="2516456" cy="632514"/>
               </a:xfrm>
               <a:prstGeom prst="rect">
                 <a:avLst/>
@@ -6370,9 +6370,9 @@
           <p:nvPr/>
         </p:nvCxnSpPr>
         <p:spPr>
-          <a:xfrm flipH="1">
-            <a:off x="1703230" y="5185920"/>
-            <a:ext cx="10740" cy="370047"/>
+          <a:xfrm>
+            <a:off x="3965794" y="4578227"/>
+            <a:ext cx="0" cy="600940"/>
           </a:xfrm>
           <a:prstGeom prst="straightConnector1">
             <a:avLst/>
@@ -6408,8 +6408,8 @@
         </p:nvCxnSpPr>
         <p:spPr>
           <a:xfrm>
-            <a:off x="1703230" y="5848355"/>
-            <a:ext cx="1777697" cy="589293"/>
+            <a:off x="3965794" y="5471555"/>
+            <a:ext cx="1362048" cy="757074"/>
           </a:xfrm>
           <a:prstGeom prst="straightConnector1">
             <a:avLst/>
@@ -6445,8 +6445,8 @@
         </p:nvCxnSpPr>
         <p:spPr>
           <a:xfrm>
-            <a:off x="4420235" y="5848355"/>
-            <a:ext cx="0" cy="404627"/>
+            <a:off x="6131905" y="5471555"/>
+            <a:ext cx="5310" cy="572408"/>
           </a:xfrm>
           <a:prstGeom prst="straightConnector1">
             <a:avLst/>
@@ -6482,8 +6482,8 @@
         </p:nvCxnSpPr>
         <p:spPr>
           <a:xfrm flipH="1">
-            <a:off x="2590344" y="5039726"/>
-            <a:ext cx="894619" cy="0"/>
+            <a:off x="4775165" y="4432032"/>
+            <a:ext cx="547369" cy="1"/>
           </a:xfrm>
           <a:prstGeom prst="straightConnector1">
             <a:avLst/>
@@ -6546,10 +6546,10 @@
         </p:nvGrpSpPr>
         <p:grpSpPr>
           <a:xfrm>
-            <a:off x="1150306" y="1261620"/>
-            <a:ext cx="6204780" cy="3989393"/>
-            <a:chOff x="862729" y="1682159"/>
-            <a:chExt cx="4653585" cy="5319192"/>
+            <a:off x="2227247" y="1261620"/>
+            <a:ext cx="4555250" cy="3989393"/>
+            <a:chOff x="1670435" y="1682159"/>
+            <a:chExt cx="3416436" cy="5319191"/>
           </a:xfrm>
         </p:grpSpPr>
         <p:sp>
@@ -6562,8 +6562,8 @@
           </p:nvSpPr>
           <p:spPr>
             <a:xfrm>
-              <a:off x="2602595" y="1682159"/>
-              <a:ext cx="2484276" cy="2179320"/>
+              <a:off x="3050958" y="1682159"/>
+              <a:ext cx="1620180" cy="2179320"/>
             </a:xfrm>
             <a:prstGeom prst="roundRect">
               <a:avLst/>
@@ -6629,10 +6629,10 @@
           </p:nvGrpSpPr>
           <p:grpSpPr>
             <a:xfrm>
-              <a:off x="862729" y="2454711"/>
-              <a:ext cx="4653585" cy="4546640"/>
-              <a:chOff x="468287" y="1877208"/>
-              <a:chExt cx="6204780" cy="3409980"/>
+              <a:off x="1670435" y="2454089"/>
+              <a:ext cx="3416436" cy="4547261"/>
+              <a:chOff x="1545228" y="1876742"/>
+              <a:chExt cx="4555248" cy="3410446"/>
             </a:xfrm>
           </p:grpSpPr>
           <p:sp>
@@ -6645,8 +6645,8 @@
             </p:nvSpPr>
             <p:spPr>
               <a:xfrm>
-                <a:off x="4701715" y="3588082"/>
-                <a:ext cx="1971352" cy="292388"/>
+                <a:off x="4706205" y="3588082"/>
+                <a:ext cx="1394271" cy="291722"/>
               </a:xfrm>
               <a:prstGeom prst="rect">
                 <a:avLst/>
@@ -6692,8 +6692,8 @@
             </p:nvSpPr>
             <p:spPr>
               <a:xfrm>
-                <a:off x="2200847" y="3587416"/>
-                <a:ext cx="1971352" cy="292388"/>
+                <a:off x="2788107" y="3587416"/>
+                <a:ext cx="1384091" cy="292388"/>
               </a:xfrm>
               <a:prstGeom prst="rect">
                 <a:avLst/>
@@ -6739,8 +6739,8 @@
             </p:nvSpPr>
             <p:spPr>
               <a:xfrm>
-                <a:off x="468287" y="1877209"/>
-                <a:ext cx="1971352" cy="292388"/>
+                <a:off x="1545228" y="1876742"/>
+                <a:ext cx="1394272" cy="292388"/>
               </a:xfrm>
               <a:prstGeom prst="rect">
                 <a:avLst/>
@@ -6786,8 +6786,8 @@
             </p:nvSpPr>
             <p:spPr>
               <a:xfrm>
-                <a:off x="2200847" y="4274094"/>
-                <a:ext cx="1971352" cy="292388"/>
+                <a:off x="2777927" y="4274094"/>
+                <a:ext cx="1394271" cy="292388"/>
               </a:xfrm>
               <a:prstGeom prst="rect">
                 <a:avLst/>
@@ -6834,7 +6834,7 @@
             <p:spPr>
               <a:xfrm>
                 <a:off x="4688982" y="4287307"/>
-                <a:ext cx="1971352" cy="292388"/>
+                <a:ext cx="1411494" cy="292388"/>
               </a:xfrm>
               <a:prstGeom prst="rect">
                 <a:avLst/>
@@ -6880,8 +6880,8 @@
             </p:nvSpPr>
             <p:spPr>
               <a:xfrm>
-                <a:off x="2200847" y="4994800"/>
-                <a:ext cx="1971352" cy="292388"/>
+                <a:off x="2777928" y="4994800"/>
+                <a:ext cx="1394271" cy="292388"/>
               </a:xfrm>
               <a:prstGeom prst="rect">
                 <a:avLst/>
@@ -6913,7 +6913,6 @@
                   <a:rPr lang="nl-BE" dirty="0"/>
                   <a:t>…</a:t>
                 </a:r>
-                <a:endParaRPr lang="nl-BE" dirty="0"/>
               </a:p>
             </p:txBody>
           </p:sp>
@@ -6928,7 +6927,7 @@
             <p:spPr>
               <a:xfrm>
                 <a:off x="4701715" y="4994800"/>
-                <a:ext cx="1971352" cy="292388"/>
+                <a:ext cx="1398761" cy="292388"/>
               </a:xfrm>
               <a:prstGeom prst="rect">
                 <a:avLst/>
@@ -6960,7 +6959,6 @@
                   <a:rPr lang="nl-BE" dirty="0"/>
                   <a:t>…</a:t>
                 </a:r>
-                <a:endParaRPr lang="nl-BE" dirty="0"/>
               </a:p>
             </p:txBody>
           </p:sp>
@@ -6974,8 +6972,8 @@
             </p:nvSpPr>
             <p:spPr>
               <a:xfrm>
-                <a:off x="3468365" y="1877208"/>
-                <a:ext cx="1971352" cy="292388"/>
+                <a:off x="3747155" y="1877208"/>
+                <a:ext cx="1394272" cy="292388"/>
               </a:xfrm>
               <a:prstGeom prst="rect">
                 <a:avLst/>
@@ -7007,7 +7005,6 @@
                   <a:rPr lang="nl-BE" dirty="0"/>
                   <a:t>Client</a:t>
                 </a:r>
-                <a:endParaRPr lang="nl-BE" dirty="0"/>
               </a:p>
             </p:txBody>
           </p:sp>
@@ -7021,8 +7018,8 @@
             </p:nvSpPr>
             <p:spPr>
               <a:xfrm>
-                <a:off x="3468364" y="2335346"/>
-                <a:ext cx="1971352" cy="292388"/>
+                <a:off x="3747155" y="2325658"/>
+                <a:ext cx="1394272" cy="292388"/>
               </a:xfrm>
               <a:prstGeom prst="rect">
                 <a:avLst/>
@@ -7051,10 +7048,10 @@
               </a:lstStyle>
               <a:p>
                 <a:r>
-                  <a:rPr lang="nl-BE" dirty="0" err="1"/>
+                  <a:rPr lang="nl-BE" i="1" dirty="0" err="1"/>
                   <a:t>Handler</a:t>
                 </a:r>
-                <a:endParaRPr lang="nl-BE" dirty="0"/>
+                <a:endParaRPr lang="nl-BE" i="1" dirty="0"/>
               </a:p>
             </p:txBody>
           </p:sp>
@@ -7067,10 +7064,10 @@
           </p:nvGrpSpPr>
           <p:grpSpPr>
             <a:xfrm>
-              <a:off x="1601986" y="2649637"/>
-              <a:ext cx="3175071" cy="3961864"/>
-              <a:chOff x="1453964" y="2005607"/>
-              <a:chExt cx="4233427" cy="2971399"/>
+              <a:off x="2193288" y="2649014"/>
+              <a:ext cx="2370733" cy="3962487"/>
+              <a:chOff x="2242366" y="2005140"/>
+              <a:chExt cx="3160976" cy="2971866"/>
             </a:xfrm>
           </p:grpSpPr>
           <p:cxnSp>
@@ -7084,8 +7081,8 @@
             </p:nvCxnSpPr>
             <p:spPr>
               <a:xfrm rot="16200000" flipH="1">
-                <a:off x="4590542" y="2473437"/>
-                <a:ext cx="960348" cy="1233351"/>
+                <a:off x="4438799" y="2605743"/>
+                <a:ext cx="970036" cy="959050"/>
               </a:xfrm>
               <a:prstGeom prst="bentConnector3">
                 <a:avLst>
@@ -7126,8 +7123,8 @@
             </p:nvCxnSpPr>
             <p:spPr>
               <a:xfrm rot="5400000">
-                <a:off x="3340442" y="2456022"/>
-                <a:ext cx="959682" cy="1267517"/>
+                <a:off x="3477538" y="2602866"/>
+                <a:ext cx="969370" cy="964139"/>
               </a:xfrm>
               <a:prstGeom prst="bentConnector3">
                 <a:avLst>
@@ -7168,8 +7165,8 @@
             </p:nvCxnSpPr>
             <p:spPr>
               <a:xfrm>
-                <a:off x="5674658" y="4561901"/>
-                <a:ext cx="12733" cy="415105"/>
+                <a:off x="5394730" y="4561901"/>
+                <a:ext cx="6367" cy="415105"/>
               </a:xfrm>
               <a:prstGeom prst="straightConnector1">
                 <a:avLst/>
@@ -7205,8 +7202,8 @@
             </p:nvCxnSpPr>
             <p:spPr>
               <a:xfrm flipH="1">
-                <a:off x="5674658" y="3862676"/>
-                <a:ext cx="12733" cy="406837"/>
+                <a:off x="5394729" y="3862009"/>
+                <a:ext cx="8612" cy="407503"/>
               </a:xfrm>
               <a:prstGeom prst="straightConnector1">
                 <a:avLst/>
@@ -7242,8 +7239,8 @@
             </p:nvCxnSpPr>
             <p:spPr>
               <a:xfrm>
-                <a:off x="3186524" y="4548688"/>
-                <a:ext cx="0" cy="428318"/>
+                <a:off x="3475064" y="4548687"/>
+                <a:ext cx="1" cy="428318"/>
               </a:xfrm>
               <a:prstGeom prst="straightConnector1">
                 <a:avLst/>
@@ -7278,9 +7275,9 @@
               <p:nvPr/>
             </p:nvCxnSpPr>
             <p:spPr>
-              <a:xfrm>
-                <a:off x="3186524" y="3862010"/>
-                <a:ext cx="0" cy="394290"/>
+              <a:xfrm flipH="1">
+                <a:off x="3475064" y="3862009"/>
+                <a:ext cx="5090" cy="394290"/>
               </a:xfrm>
               <a:prstGeom prst="straightConnector1">
                 <a:avLst/>
@@ -7315,9 +7312,9 @@
               <p:nvPr/>
             </p:nvCxnSpPr>
             <p:spPr>
-              <a:xfrm flipV="1">
-                <a:off x="2439640" y="2005607"/>
-                <a:ext cx="1028726" cy="1"/>
+              <a:xfrm>
+                <a:off x="2939500" y="2005140"/>
+                <a:ext cx="807654" cy="466"/>
               </a:xfrm>
               <a:prstGeom prst="straightConnector1">
                 <a:avLst/>
@@ -7353,8 +7350,8 @@
             </p:nvCxnSpPr>
             <p:spPr>
               <a:xfrm rot="10800000">
-                <a:off x="1453964" y="2151803"/>
-                <a:ext cx="746884" cy="2250692"/>
+                <a:off x="2242366" y="2151334"/>
+                <a:ext cx="535562" cy="2251159"/>
               </a:xfrm>
               <a:prstGeom prst="bentConnector2">
                 <a:avLst/>

</xml_diff>